<commit_message>
adding newdata , half finished model performance script, minor change to app.py
</commit_message>
<xml_diff>
--- a/Part 3 Model production/AAVAiL Revenue Prediction - Model Production Report.pptx
+++ b/Part 3 Model production/AAVAiL Revenue Prediction - Model Production Report.pptx
@@ -5,12 +5,15 @@
     <p:sldMasterId id="2147483660" r:id="rId1"/>
   </p:sldMasterIdLst>
   <p:notesMasterIdLst>
-    <p:notesMasterId r:id="rId5"/>
+    <p:notesMasterId r:id="rId8"/>
   </p:notesMasterIdLst>
   <p:sldIdLst>
     <p:sldId id="256" r:id="rId2"/>
     <p:sldId id="257" r:id="rId3"/>
     <p:sldId id="258" r:id="rId4"/>
+    <p:sldId id="259" r:id="rId5"/>
+    <p:sldId id="260" r:id="rId6"/>
+    <p:sldId id="261" r:id="rId7"/>
   </p:sldIdLst>
   <p:sldSz cx="12192000" cy="6858000"/>
   <p:notesSz cx="6858000" cy="9144000"/>
@@ -199,7 +202,7 @@
           <a:p>
             <a:fld id="{6B972669-857D-BB4A-A249-2A6DFC7030D3}" type="datetimeFigureOut">
               <a:rPr lang="en-US" smtClean="0"/>
-              <a:t>4/3/21</a:t>
+              <a:t>4/4/21</a:t>
             </a:fld>
             <a:endParaRPr lang="en-US"/>
           </a:p>
@@ -630,7 +633,7 @@
           <a:p>
             <a:fld id="{494076E2-43EB-7D4D-9539-7B25001E7176}" type="datetimeFigureOut">
               <a:rPr lang="en-US" smtClean="0"/>
-              <a:t>4/3/21</a:t>
+              <a:t>4/4/21</a:t>
             </a:fld>
             <a:endParaRPr lang="en-US"/>
           </a:p>
@@ -800,7 +803,7 @@
           <a:p>
             <a:fld id="{494076E2-43EB-7D4D-9539-7B25001E7176}" type="datetimeFigureOut">
               <a:rPr lang="en-US" smtClean="0"/>
-              <a:t>4/3/21</a:t>
+              <a:t>4/4/21</a:t>
             </a:fld>
             <a:endParaRPr lang="en-US"/>
           </a:p>
@@ -980,7 +983,7 @@
           <a:p>
             <a:fld id="{494076E2-43EB-7D4D-9539-7B25001E7176}" type="datetimeFigureOut">
               <a:rPr lang="en-US" smtClean="0"/>
-              <a:t>4/3/21</a:t>
+              <a:t>4/4/21</a:t>
             </a:fld>
             <a:endParaRPr lang="en-US"/>
           </a:p>
@@ -1150,7 +1153,7 @@
           <a:p>
             <a:fld id="{494076E2-43EB-7D4D-9539-7B25001E7176}" type="datetimeFigureOut">
               <a:rPr lang="en-US" smtClean="0"/>
-              <a:t>4/3/21</a:t>
+              <a:t>4/4/21</a:t>
             </a:fld>
             <a:endParaRPr lang="en-US"/>
           </a:p>
@@ -1418,7 +1421,7 @@
           <a:p>
             <a:fld id="{494076E2-43EB-7D4D-9539-7B25001E7176}" type="datetimeFigureOut">
               <a:rPr lang="en-US" smtClean="0"/>
-              <a:t>4/3/21</a:t>
+              <a:t>4/4/21</a:t>
             </a:fld>
             <a:endParaRPr lang="en-US"/>
           </a:p>
@@ -1650,7 +1653,7 @@
           <a:p>
             <a:fld id="{494076E2-43EB-7D4D-9539-7B25001E7176}" type="datetimeFigureOut">
               <a:rPr lang="en-US" smtClean="0"/>
-              <a:t>4/3/21</a:t>
+              <a:t>4/4/21</a:t>
             </a:fld>
             <a:endParaRPr lang="en-US"/>
           </a:p>
@@ -2009,7 +2012,7 @@
           <a:p>
             <a:fld id="{494076E2-43EB-7D4D-9539-7B25001E7176}" type="datetimeFigureOut">
               <a:rPr lang="en-US" smtClean="0"/>
-              <a:t>4/3/21</a:t>
+              <a:t>4/4/21</a:t>
             </a:fld>
             <a:endParaRPr lang="en-US"/>
           </a:p>
@@ -2150,7 +2153,7 @@
           <a:p>
             <a:fld id="{494076E2-43EB-7D4D-9539-7B25001E7176}" type="datetimeFigureOut">
               <a:rPr lang="en-US" smtClean="0"/>
-              <a:t>4/3/21</a:t>
+              <a:t>4/4/21</a:t>
             </a:fld>
             <a:endParaRPr lang="en-US"/>
           </a:p>
@@ -2245,7 +2248,7 @@
           <a:p>
             <a:fld id="{494076E2-43EB-7D4D-9539-7B25001E7176}" type="datetimeFigureOut">
               <a:rPr lang="en-US" smtClean="0"/>
-              <a:t>4/3/21</a:t>
+              <a:t>4/4/21</a:t>
             </a:fld>
             <a:endParaRPr lang="en-US"/>
           </a:p>
@@ -2602,7 +2605,7 @@
           <a:p>
             <a:fld id="{494076E2-43EB-7D4D-9539-7B25001E7176}" type="datetimeFigureOut">
               <a:rPr lang="en-US" smtClean="0"/>
-              <a:t>4/3/21</a:t>
+              <a:t>4/4/21</a:t>
             </a:fld>
             <a:endParaRPr lang="en-US"/>
           </a:p>
@@ -2959,7 +2962,7 @@
           <a:p>
             <a:fld id="{494076E2-43EB-7D4D-9539-7B25001E7176}" type="datetimeFigureOut">
               <a:rPr lang="en-US" smtClean="0"/>
-              <a:t>4/3/21</a:t>
+              <a:t>4/4/21</a:t>
             </a:fld>
             <a:endParaRPr lang="en-US"/>
           </a:p>
@@ -3201,7 +3204,7 @@
           <a:p>
             <a:fld id="{494076E2-43EB-7D4D-9539-7B25001E7176}" type="datetimeFigureOut">
               <a:rPr lang="en-US" smtClean="0"/>
-              <a:t>4/3/21</a:t>
+              <a:t>4/4/21</a:t>
             </a:fld>
             <a:endParaRPr lang="en-US"/>
           </a:p>
@@ -3906,12 +3909,181 @@
             <p:ph idx="1"/>
           </p:nvPr>
         </p:nvSpPr>
-        <p:spPr/>
-        <p:txBody>
-          <a:bodyPr/>
-          <a:lstStyle/>
-          <a:p>
-            <a:endParaRPr lang="en-US"/>
+        <p:spPr>
+          <a:xfrm>
+            <a:off x="384313" y="2638044"/>
+            <a:ext cx="11423374" cy="4219956"/>
+          </a:xfrm>
+        </p:spPr>
+        <p:txBody>
+          <a:bodyPr>
+            <a:normAutofit fontScale="92500" lnSpcReduction="20000"/>
+          </a:bodyPr>
+          <a:lstStyle/>
+          <a:p>
+            <a:r>
+              <a:rPr lang="en-US" sz="1200" dirty="0"/>
+              <a:t>I had used the workflow template code templates from a previous AI Workflow course, and changed various elements of it to fit the revenue prediction assignment</a:t>
+            </a:r>
+          </a:p>
+          <a:p>
+            <a:r>
+              <a:rPr lang="en-US" sz="1200" dirty="0"/>
+              <a:t>Development took a long time for me to get to a working API to train on data and predict for the top 10 countries, so in the week’s time allocated by the course for model production, unfortunately I was unable to finish everything I wanted to given I also have a full time job, before I have to submit this assignment to not be overdue, but I finished most of the tasks required.</a:t>
+            </a:r>
+          </a:p>
+          <a:p>
+            <a:r>
+              <a:rPr lang="en-US" sz="1200" dirty="0"/>
+              <a:t>Please find my API code in the </a:t>
+            </a:r>
+            <a:r>
+              <a:rPr lang="en-US" sz="1200" dirty="0" err="1"/>
+              <a:t>api</a:t>
+            </a:r>
+            <a:r>
+              <a:rPr lang="en-US" sz="1200" dirty="0"/>
+              <a:t> folder within the “Part 3 Model production” folder</a:t>
+            </a:r>
+          </a:p>
+          <a:p>
+            <a:r>
+              <a:rPr lang="en-US" sz="1200" dirty="0"/>
+              <a:t>Within this, there are python modules for:</a:t>
+            </a:r>
+          </a:p>
+          <a:p>
+            <a:pPr lvl="1"/>
+            <a:r>
+              <a:rPr lang="en-US" sz="1100" dirty="0"/>
+              <a:t>The app (</a:t>
+            </a:r>
+            <a:r>
+              <a:rPr lang="en-US" sz="1100" i="1" dirty="0" err="1"/>
+              <a:t>app.py</a:t>
+            </a:r>
+            <a:r>
+              <a:rPr lang="en-US" sz="1100" i="1" dirty="0"/>
+              <a:t>)</a:t>
+            </a:r>
+            <a:endParaRPr lang="en-US" sz="1100" dirty="0"/>
+          </a:p>
+          <a:p>
+            <a:pPr lvl="1"/>
+            <a:r>
+              <a:rPr lang="en-US" sz="1100" dirty="0"/>
+              <a:t>The model (</a:t>
+            </a:r>
+            <a:r>
+              <a:rPr lang="en-US" sz="1100" i="1" dirty="0" err="1"/>
+              <a:t>model.py</a:t>
+            </a:r>
+            <a:r>
+              <a:rPr lang="en-US" sz="1100" dirty="0"/>
+              <a:t>)</a:t>
+            </a:r>
+          </a:p>
+          <a:p>
+            <a:pPr lvl="1"/>
+            <a:r>
+              <a:rPr lang="en-US" sz="1100" dirty="0"/>
+              <a:t>The logger (</a:t>
+            </a:r>
+            <a:r>
+              <a:rPr lang="en-US" sz="1100" i="1" dirty="0" err="1"/>
+              <a:t>logger.py</a:t>
+            </a:r>
+            <a:r>
+              <a:rPr lang="en-US" sz="1100" dirty="0"/>
+              <a:t>)</a:t>
+            </a:r>
+          </a:p>
+          <a:p>
+            <a:pPr lvl="1"/>
+            <a:r>
+              <a:rPr lang="en-US" sz="1100" dirty="0"/>
+              <a:t>The run unit tests script (</a:t>
+            </a:r>
+            <a:r>
+              <a:rPr lang="en-US" sz="1100" i="1" dirty="0"/>
+              <a:t>run-</a:t>
+            </a:r>
+            <a:r>
+              <a:rPr lang="en-US" sz="1100" i="1" dirty="0" err="1"/>
+              <a:t>tests.py</a:t>
+            </a:r>
+            <a:r>
+              <a:rPr lang="en-US" sz="1100" dirty="0"/>
+              <a:t>)</a:t>
+            </a:r>
+          </a:p>
+          <a:p>
+            <a:r>
+              <a:rPr lang="en-US" sz="1200" dirty="0"/>
+              <a:t>Training data exists in </a:t>
+            </a:r>
+            <a:r>
+              <a:rPr lang="en-US" sz="1200" i="1" dirty="0"/>
+              <a:t>data</a:t>
+            </a:r>
+          </a:p>
+          <a:p>
+            <a:r>
+              <a:rPr lang="en-US" sz="1200" dirty="0"/>
+              <a:t>Production testing /future data exists in </a:t>
+            </a:r>
+            <a:r>
+              <a:rPr lang="en-US" sz="1200" i="1" dirty="0" err="1"/>
+              <a:t>newdata</a:t>
+            </a:r>
+            <a:endParaRPr lang="en-US" sz="1200" i="1" dirty="0"/>
+          </a:p>
+          <a:p>
+            <a:r>
+              <a:rPr lang="en-US" sz="1200" dirty="0"/>
+              <a:t>Models exist in </a:t>
+            </a:r>
+            <a:r>
+              <a:rPr lang="en-US" sz="1200" i="1" dirty="0"/>
+              <a:t>models</a:t>
+            </a:r>
+          </a:p>
+          <a:p>
+            <a:r>
+              <a:rPr lang="en-US" sz="1200" dirty="0"/>
+              <a:t>Unit tests exist in </a:t>
+            </a:r>
+            <a:r>
+              <a:rPr lang="en-US" sz="1200" i="1" dirty="0" err="1"/>
+              <a:t>unittests</a:t>
+            </a:r>
+            <a:endParaRPr lang="en-US" sz="1200" i="1" dirty="0"/>
+          </a:p>
+          <a:p>
+            <a:r>
+              <a:rPr lang="en-US" sz="1200" dirty="0"/>
+              <a:t>Logs exist in </a:t>
+            </a:r>
+            <a:r>
+              <a:rPr lang="en-US" sz="1200" i="1" dirty="0"/>
+              <a:t>logs</a:t>
+            </a:r>
+            <a:endParaRPr lang="en-US" sz="1200" dirty="0"/>
+          </a:p>
+          <a:p>
+            <a:pPr marL="0" indent="0">
+              <a:buNone/>
+            </a:pPr>
+            <a:endParaRPr lang="en-US" sz="1200" dirty="0"/>
+          </a:p>
+          <a:p>
+            <a:r>
+              <a:rPr lang="en-US" sz="1200" dirty="0"/>
+              <a:t>Development time available meant that I was unable to finish the ability to the test model train and predict functions with a ‘test’ parameter e.g. separate it from a ‘production’ call, but given more time this would be implemented.</a:t>
+            </a:r>
+          </a:p>
+          <a:p>
+            <a:endParaRPr lang="en-US" sz="1200" dirty="0"/>
           </a:p>
         </p:txBody>
       </p:sp>
@@ -3919,6 +4091,441 @@
     <p:extLst>
       <p:ext uri="{BB962C8B-B14F-4D97-AF65-F5344CB8AC3E}">
         <p14:creationId xmlns:p14="http://schemas.microsoft.com/office/powerpoint/2010/main" val="776244251"/>
+      </p:ext>
+    </p:extLst>
+  </p:cSld>
+  <p:clrMapOvr>
+    <a:masterClrMapping/>
+  </p:clrMapOvr>
+</p:sld>
+</file>
+
+<file path=ppt/slides/slide4.xml><?xml version="1.0" encoding="utf-8"?>
+<p:sld xmlns:a="http://schemas.openxmlformats.org/drawingml/2006/main" xmlns:r="http://schemas.openxmlformats.org/officeDocument/2006/relationships" xmlns:p="http://schemas.openxmlformats.org/presentationml/2006/main">
+  <p:cSld>
+    <p:spTree>
+      <p:nvGrpSpPr>
+        <p:cNvPr id="1" name=""/>
+        <p:cNvGrpSpPr/>
+        <p:nvPr/>
+      </p:nvGrpSpPr>
+      <p:grpSpPr>
+        <a:xfrm>
+          <a:off x="0" y="0"/>
+          <a:ext cx="0" cy="0"/>
+          <a:chOff x="0" y="0"/>
+          <a:chExt cx="0" cy="0"/>
+        </a:xfrm>
+      </p:grpSpPr>
+      <p:sp>
+        <p:nvSpPr>
+          <p:cNvPr id="2" name="Title 1">
+            <a:extLst>
+              <a:ext uri="{FF2B5EF4-FFF2-40B4-BE49-F238E27FC236}">
+                <a16:creationId xmlns:a16="http://schemas.microsoft.com/office/drawing/2014/main" id="{07F50EEA-BBFE-C24F-B8D5-35BD5D7FD3F5}"/>
+              </a:ext>
+            </a:extLst>
+          </p:cNvPr>
+          <p:cNvSpPr>
+            <a:spLocks noGrp="1"/>
+          </p:cNvSpPr>
+          <p:nvPr>
+            <p:ph type="title"/>
+          </p:nvPr>
+        </p:nvSpPr>
+        <p:spPr/>
+        <p:txBody>
+          <a:bodyPr>
+            <a:normAutofit fontScale="90000"/>
+          </a:bodyPr>
+          <a:lstStyle/>
+          <a:p>
+            <a:r>
+              <a:rPr lang="en-GB" dirty="0"/>
+              <a:t>2. Using Docker, bundle your API, model, and unit tests.</a:t>
+            </a:r>
+            <a:br>
+              <a:rPr lang="en-GB" dirty="0"/>
+            </a:br>
+            <a:endParaRPr lang="en-US" dirty="0"/>
+          </a:p>
+        </p:txBody>
+      </p:sp>
+      <p:sp>
+        <p:nvSpPr>
+          <p:cNvPr id="3" name="Content Placeholder 2">
+            <a:extLst>
+              <a:ext uri="{FF2B5EF4-FFF2-40B4-BE49-F238E27FC236}">
+                <a16:creationId xmlns:a16="http://schemas.microsoft.com/office/drawing/2014/main" id="{99B627D5-E435-DC41-9F13-1EDBCD6ED7E8}"/>
+              </a:ext>
+            </a:extLst>
+          </p:cNvPr>
+          <p:cNvSpPr>
+            <a:spLocks noGrp="1"/>
+          </p:cNvSpPr>
+          <p:nvPr>
+            <p:ph idx="1"/>
+          </p:nvPr>
+        </p:nvSpPr>
+        <p:spPr>
+          <a:xfrm>
+            <a:off x="2231136" y="2638044"/>
+            <a:ext cx="7729728" cy="4054304"/>
+          </a:xfrm>
+        </p:spPr>
+        <p:txBody>
+          <a:bodyPr>
+            <a:normAutofit/>
+          </a:bodyPr>
+          <a:lstStyle/>
+          <a:p>
+            <a:r>
+              <a:rPr lang="en-US" dirty="0"/>
+              <a:t>Docker was used to build the image and develop/test unit tests as well as the core API modules</a:t>
+            </a:r>
+          </a:p>
+          <a:p>
+            <a:r>
+              <a:rPr lang="en-US" dirty="0"/>
+              <a:t>Please see the </a:t>
+            </a:r>
+            <a:r>
+              <a:rPr lang="en-US" i="1" dirty="0" err="1"/>
+              <a:t>Dockerfile</a:t>
+            </a:r>
+            <a:r>
+              <a:rPr lang="en-US" dirty="0"/>
+              <a:t> and </a:t>
+            </a:r>
+            <a:r>
+              <a:rPr lang="en-US" i="1" dirty="0" err="1"/>
+              <a:t>requirements.</a:t>
+            </a:r>
+            <a:r>
+              <a:rPr lang="en-US" dirty="0" err="1"/>
+              <a:t>txt</a:t>
+            </a:r>
+            <a:r>
+              <a:rPr lang="en-US" dirty="0"/>
+              <a:t> files within the </a:t>
+            </a:r>
+            <a:r>
+              <a:rPr lang="en-US" dirty="0" err="1"/>
+              <a:t>api</a:t>
+            </a:r>
+            <a:r>
+              <a:rPr lang="en-US" dirty="0"/>
+              <a:t> folder</a:t>
+            </a:r>
+          </a:p>
+          <a:p>
+            <a:r>
+              <a:rPr lang="en-US" dirty="0"/>
+              <a:t>It was then ran locally and used to make some test predictions and facilitate further development.</a:t>
+            </a:r>
+          </a:p>
+          <a:p>
+            <a:endParaRPr lang="en-GB" dirty="0"/>
+          </a:p>
+          <a:p>
+            <a:r>
+              <a:rPr lang="en-GB" dirty="0"/>
+              <a:t>Commands used to build </a:t>
+            </a:r>
+            <a:r>
+              <a:rPr lang="en-GB" dirty="0" err="1"/>
+              <a:t>api</a:t>
+            </a:r>
+            <a:r>
+              <a:rPr lang="en-GB" dirty="0"/>
+              <a:t> locally:</a:t>
+            </a:r>
+          </a:p>
+          <a:p>
+            <a:pPr lvl="1"/>
+            <a:r>
+              <a:rPr lang="en-GB" i="1" dirty="0"/>
+              <a:t>cd &lt;</a:t>
+            </a:r>
+            <a:r>
+              <a:rPr lang="en-GB" i="1" dirty="0" err="1"/>
+              <a:t>api</a:t>
+            </a:r>
+            <a:r>
+              <a:rPr lang="en-GB" i="1" dirty="0"/>
+              <a:t> directory&gt;</a:t>
+            </a:r>
+          </a:p>
+          <a:p>
+            <a:pPr lvl="1"/>
+            <a:r>
+              <a:rPr lang="en-GB" i="1" dirty="0"/>
+              <a:t>docker build . -t </a:t>
+            </a:r>
+            <a:r>
+              <a:rPr lang="en-GB" i="1" dirty="0" err="1"/>
+              <a:t>api</a:t>
+            </a:r>
+            <a:endParaRPr lang="en-GB" i="1" dirty="0"/>
+          </a:p>
+          <a:p>
+            <a:pPr lvl="1"/>
+            <a:r>
+              <a:rPr lang="en-GB" i="1" dirty="0"/>
+              <a:t>docker run -it -p 8080:8080 </a:t>
+            </a:r>
+            <a:r>
+              <a:rPr lang="en-GB" i="1" dirty="0" err="1"/>
+              <a:t>api</a:t>
+            </a:r>
+            <a:endParaRPr lang="en-GB" i="1" dirty="0"/>
+          </a:p>
+          <a:p>
+            <a:endParaRPr lang="en-GB" dirty="0"/>
+          </a:p>
+          <a:p>
+            <a:endParaRPr lang="en-US" dirty="0"/>
+          </a:p>
+        </p:txBody>
+      </p:sp>
+    </p:spTree>
+    <p:extLst>
+      <p:ext uri="{BB962C8B-B14F-4D97-AF65-F5344CB8AC3E}">
+        <p14:creationId xmlns:p14="http://schemas.microsoft.com/office/powerpoint/2010/main" val="2302802352"/>
+      </p:ext>
+    </p:extLst>
+  </p:cSld>
+  <p:clrMapOvr>
+    <a:masterClrMapping/>
+  </p:clrMapOvr>
+</p:sld>
+</file>
+
+<file path=ppt/slides/slide5.xml><?xml version="1.0" encoding="utf-8"?>
+<p:sld xmlns:a="http://schemas.openxmlformats.org/drawingml/2006/main" xmlns:r="http://schemas.openxmlformats.org/officeDocument/2006/relationships" xmlns:p="http://schemas.openxmlformats.org/presentationml/2006/main">
+  <p:cSld>
+    <p:spTree>
+      <p:nvGrpSpPr>
+        <p:cNvPr id="1" name=""/>
+        <p:cNvGrpSpPr/>
+        <p:nvPr/>
+      </p:nvGrpSpPr>
+      <p:grpSpPr>
+        <a:xfrm>
+          <a:off x="0" y="0"/>
+          <a:ext cx="0" cy="0"/>
+          <a:chOff x="0" y="0"/>
+          <a:chExt cx="0" cy="0"/>
+        </a:xfrm>
+      </p:grpSpPr>
+      <p:sp>
+        <p:nvSpPr>
+          <p:cNvPr id="2" name="Title 1">
+            <a:extLst>
+              <a:ext uri="{FF2B5EF4-FFF2-40B4-BE49-F238E27FC236}">
+                <a16:creationId xmlns:a16="http://schemas.microsoft.com/office/drawing/2014/main" id="{82C31728-C6CC-8E4E-87E4-EBE25EA65C2C}"/>
+              </a:ext>
+            </a:extLst>
+          </p:cNvPr>
+          <p:cNvSpPr>
+            <a:spLocks noGrp="1"/>
+          </p:cNvSpPr>
+          <p:nvPr>
+            <p:ph type="title"/>
+          </p:nvPr>
+        </p:nvSpPr>
+        <p:spPr>
+          <a:xfrm>
+            <a:off x="2231136" y="636104"/>
+            <a:ext cx="7729728" cy="1517308"/>
+          </a:xfrm>
+        </p:spPr>
+        <p:txBody>
+          <a:bodyPr>
+            <a:normAutofit fontScale="90000"/>
+          </a:bodyPr>
+          <a:lstStyle/>
+          <a:p>
+            <a:r>
+              <a:rPr lang="en-GB" dirty="0"/>
+              <a:t>3. Using test-driven development iterate on your API in a way that anticipates scale, load, and drift.</a:t>
+            </a:r>
+            <a:br>
+              <a:rPr lang="en-GB" dirty="0"/>
+            </a:br>
+            <a:endParaRPr lang="en-US" dirty="0"/>
+          </a:p>
+        </p:txBody>
+      </p:sp>
+      <p:sp>
+        <p:nvSpPr>
+          <p:cNvPr id="3" name="Content Placeholder 2">
+            <a:extLst>
+              <a:ext uri="{FF2B5EF4-FFF2-40B4-BE49-F238E27FC236}">
+                <a16:creationId xmlns:a16="http://schemas.microsoft.com/office/drawing/2014/main" id="{1A4D8B0F-EEDA-364C-B9AF-F2CDFE46CF83}"/>
+              </a:ext>
+            </a:extLst>
+          </p:cNvPr>
+          <p:cNvSpPr>
+            <a:spLocks noGrp="1"/>
+          </p:cNvSpPr>
+          <p:nvPr>
+            <p:ph idx="1"/>
+          </p:nvPr>
+        </p:nvSpPr>
+        <p:spPr/>
+        <p:txBody>
+          <a:bodyPr/>
+          <a:lstStyle/>
+          <a:p>
+            <a:r>
+              <a:rPr lang="en-US" dirty="0"/>
+              <a:t>As previously mentioned I was unable to iterate on my API further than the base model given the time allocated by the course</a:t>
+            </a:r>
+          </a:p>
+          <a:p>
+            <a:endParaRPr lang="en-US" dirty="0"/>
+          </a:p>
+          <a:p>
+            <a:r>
+              <a:rPr lang="en-US" dirty="0"/>
+              <a:t>I would ensure iterations and improvements were implemented, given more time by the course</a:t>
+            </a:r>
+          </a:p>
+        </p:txBody>
+      </p:sp>
+    </p:spTree>
+    <p:extLst>
+      <p:ext uri="{BB962C8B-B14F-4D97-AF65-F5344CB8AC3E}">
+        <p14:creationId xmlns:p14="http://schemas.microsoft.com/office/powerpoint/2010/main" val="2928376974"/>
+      </p:ext>
+    </p:extLst>
+  </p:cSld>
+  <p:clrMapOvr>
+    <a:masterClrMapping/>
+  </p:clrMapOvr>
+</p:sld>
+</file>
+
+<file path=ppt/slides/slide6.xml><?xml version="1.0" encoding="utf-8"?>
+<p:sld xmlns:a="http://schemas.openxmlformats.org/drawingml/2006/main" xmlns:r="http://schemas.openxmlformats.org/officeDocument/2006/relationships" xmlns:p="http://schemas.openxmlformats.org/presentationml/2006/main">
+  <p:cSld>
+    <p:spTree>
+      <p:nvGrpSpPr>
+        <p:cNvPr id="1" name=""/>
+        <p:cNvGrpSpPr/>
+        <p:nvPr/>
+      </p:nvGrpSpPr>
+      <p:grpSpPr>
+        <a:xfrm>
+          <a:off x="0" y="0"/>
+          <a:ext cx="0" cy="0"/>
+          <a:chOff x="0" y="0"/>
+          <a:chExt cx="0" cy="0"/>
+        </a:xfrm>
+      </p:grpSpPr>
+      <p:sp>
+        <p:nvSpPr>
+          <p:cNvPr id="2" name="Title 1">
+            <a:extLst>
+              <a:ext uri="{FF2B5EF4-FFF2-40B4-BE49-F238E27FC236}">
+                <a16:creationId xmlns:a16="http://schemas.microsoft.com/office/drawing/2014/main" id="{3C012DCA-DDE8-2E42-99D8-C6BB9023C05F}"/>
+              </a:ext>
+            </a:extLst>
+          </p:cNvPr>
+          <p:cNvSpPr>
+            <a:spLocks noGrp="1"/>
+          </p:cNvSpPr>
+          <p:nvPr>
+            <p:ph type="title"/>
+          </p:nvPr>
+        </p:nvSpPr>
+        <p:spPr>
+          <a:xfrm>
+            <a:off x="2231136" y="331304"/>
+            <a:ext cx="7729728" cy="1822108"/>
+          </a:xfrm>
+        </p:spPr>
+        <p:txBody>
+          <a:bodyPr>
+            <a:normAutofit fontScale="90000"/>
+          </a:bodyPr>
+          <a:lstStyle/>
+          <a:p>
+            <a:r>
+              <a:rPr lang="en-GB" dirty="0"/>
+              <a:t>4. Create a post-production analysis script that investigates the relationship between model performance and the business metric.</a:t>
+            </a:r>
+            <a:br>
+              <a:rPr lang="en-GB" dirty="0"/>
+            </a:br>
+            <a:endParaRPr lang="en-US" dirty="0"/>
+          </a:p>
+        </p:txBody>
+      </p:sp>
+      <p:sp>
+        <p:nvSpPr>
+          <p:cNvPr id="3" name="Content Placeholder 2">
+            <a:extLst>
+              <a:ext uri="{FF2B5EF4-FFF2-40B4-BE49-F238E27FC236}">
+                <a16:creationId xmlns:a16="http://schemas.microsoft.com/office/drawing/2014/main" id="{2D935818-5583-CB4E-B8CA-7739EA034CB8}"/>
+              </a:ext>
+            </a:extLst>
+          </p:cNvPr>
+          <p:cNvSpPr>
+            <a:spLocks noGrp="1"/>
+          </p:cNvSpPr>
+          <p:nvPr>
+            <p:ph idx="1"/>
+          </p:nvPr>
+        </p:nvSpPr>
+        <p:spPr/>
+        <p:txBody>
+          <a:bodyPr/>
+          <a:lstStyle/>
+          <a:p>
+            <a:r>
+              <a:rPr lang="en-US" dirty="0"/>
+              <a:t>I had started the post production analysis script, which you will find in </a:t>
+            </a:r>
+            <a:r>
+              <a:rPr lang="en-US" i="1" dirty="0" err="1"/>
+              <a:t>model_performance.py</a:t>
+            </a:r>
+            <a:endParaRPr lang="en-US" dirty="0"/>
+          </a:p>
+          <a:p>
+            <a:endParaRPr lang="en-US" dirty="0"/>
+          </a:p>
+          <a:p>
+            <a:r>
+              <a:rPr lang="en-US" dirty="0"/>
+              <a:t>I have commented what I would do next in this script, given more time</a:t>
+            </a:r>
+          </a:p>
+          <a:p>
+            <a:endParaRPr lang="en-US" dirty="0"/>
+          </a:p>
+          <a:p>
+            <a:r>
+              <a:rPr lang="en-US" dirty="0"/>
+              <a:t>If I find some time in the coming days away from my job post assignment submission, to finish this script, </a:t>
+            </a:r>
+            <a:r>
+              <a:rPr lang="en-US" dirty="0" err="1"/>
+              <a:t>analyse</a:t>
+            </a:r>
+            <a:r>
+              <a:rPr lang="en-US" dirty="0"/>
+              <a:t> model performance, and make further code improvements, I will do so</a:t>
+            </a:r>
+          </a:p>
+        </p:txBody>
+      </p:sp>
+    </p:spTree>
+    <p:extLst>
+      <p:ext uri="{BB962C8B-B14F-4D97-AF65-F5344CB8AC3E}">
+        <p14:creationId xmlns:p14="http://schemas.microsoft.com/office/powerpoint/2010/main" val="139936362"/>
       </p:ext>
     </p:extLst>
   </p:cSld>

</xml_diff>